<commit_message>
Register & View Employees Merged to Employee  Management
</commit_message>
<xml_diff>
--- a/Presentation1.pptx
+++ b/Presentation1.pptx
@@ -9,6 +9,7 @@
     <p:sldId id="257" r:id="rId3"/>
     <p:sldId id="258" r:id="rId4"/>
     <p:sldId id="259" r:id="rId5"/>
+    <p:sldId id="260" r:id="rId6"/>
   </p:sldIdLst>
   <p:sldSz cx="12192000" cy="6858000"/>
   <p:notesSz cx="6858000" cy="9144000"/>
@@ -256,6 +257,34 @@
 </inkml:ink>
 </file>
 
+<file path=ppt/ink/ink14.xml><?xml version="1.0" encoding="utf-8"?>
+<inkml:ink xmlns:inkml="http://www.w3.org/2003/InkML">
+  <inkml:definitions>
+    <inkml:context xml:id="ctx0">
+      <inkml:inkSource xml:id="inkSrc0">
+        <inkml:traceFormat>
+          <inkml:channel name="X" type="integer" min="-2.14748E9" max="2.14748E9" units="cm"/>
+          <inkml:channel name="Y" type="integer" min="-2.14748E9" max="2.14748E9" units="cm"/>
+          <inkml:channel name="F" type="integer" max="32767" units="dev"/>
+        </inkml:traceFormat>
+        <inkml:channelProperties>
+          <inkml:channelProperty channel="X" name="resolution" value="1000" units="1/cm"/>
+          <inkml:channelProperty channel="Y" name="resolution" value="1000" units="1/cm"/>
+          <inkml:channelProperty channel="F" name="resolution" value="0" units="1/dev"/>
+        </inkml:channelProperties>
+      </inkml:inkSource>
+      <inkml:timestamp xml:id="ts0" timeString="2022-03-12T13:43:29.342"/>
+    </inkml:context>
+    <inkml:brush xml:id="br0">
+      <inkml:brushProperty name="width" value="0.05" units="cm"/>
+      <inkml:brushProperty name="height" value="0.05" units="cm"/>
+      <inkml:brushProperty name="color" value="#E71224"/>
+    </inkml:brush>
+  </inkml:definitions>
+  <inkml:trace contextRef="#ctx0" brushRef="#br0">5660 1019 24575,'-26'-8'0,"-1"2"0,0 1 0,-39-3 0,9 2 0,-314-62 0,292 48 0,1-4 0,-124-56 0,-228-173 0,158 84 0,196 127 0,-135-55 0,156 79 0,-92-20 0,-59 3 0,87 16 0,-102-32 0,103 21 0,61 15 0,35 8 0,-1 1 0,0 1 0,-39-3 0,-309 8 0,170 2 0,132-2 0,1 4 0,0 2 0,-104 24 0,-391 139 0,524-155 0,-39 11 0,-106 51 0,-90 48 0,256-118 0,12-4 0,0 0 0,0 0 0,0 0 0,0 1 0,1 0 0,-1 0 0,1 0 0,0 1 0,0 0 0,0 0 0,0 0 0,-4 5 0,-6 13 0,0 0 0,2 1 0,-16 35 0,3-4 0,-83 146 0,-85 176 0,174-329 0,2 1 0,3 1 0,2 0 0,2 1 0,-5 51 0,9-22 0,4 0 0,10 121 0,61 392 0,-39-425 0,77 247 0,-68-316 0,72 138 0,-85-187 0,5 11 0,2-1 0,3-2 0,71 88 0,117 105 0,-187-213 0,2-3 0,1-1 0,2-1 0,1-3 0,1-1 0,1-2 0,1-2 0,2-3 0,0-1 0,1-2 0,1-3 0,83 16 0,336 22 0,1-47 0,-336-12 0,0-5 0,256-56 0,-225 31 0,176-16 0,169 22 0,311-18 0,-619 27 0,84-10 0,-201 17 0,113-32 0,426-196 0,-521 198 0,466-226 0,-544 258 0,2-1 0,-1-1 0,35-25 0,-53 34 0,0-1 0,-1 0 0,1-1 0,-1 1 0,0-1 0,-1 0 0,0-1 0,0 1 0,0-1 0,-1 0 0,0-1 0,3-11 0,1-12 0,-1 0 0,-2 0 0,2-65 0,-12-104 0,4 176 0,-7-65 0,-4 0 0,-3 0 0,-34-107 0,29 121 0,-16-50 0,31 113 0,0 1 0,-1 0 0,-1 0 0,0 1 0,-14-18 0,-47-42 0,-1 0 0,-70-113 0,82 115 0,-55-86 0,85 117 0,0 1 0,-3 1 0,-43-41 0,-109-82 0,143 128 0,-1 2 0,-2 2 0,-1 1 0,-1 3 0,-86-33 0,22 21 0,69 24 0,0-1 0,1-2 0,1-2 0,-45-25 0,40 17-1365,23 17-5461</inkml:trace>
+</inkml:ink>
+</file>
+
 <file path=ppt/ink/ink2.xml><?xml version="1.0" encoding="utf-8"?>
 <inkml:ink xmlns:inkml="http://www.w3.org/2003/InkML">
   <inkml:definitions>
@@ -629,7 +658,7 @@
           <a:p>
             <a:fld id="{8A36C09B-041E-469C-AF42-668EC102CB61}" type="datetimeFigureOut">
               <a:rPr lang="en-IN" smtClean="0"/>
-              <a:t>01-03-2022</a:t>
+              <a:t>15-03-2022</a:t>
             </a:fld>
             <a:endParaRPr lang="en-IN"/>
           </a:p>
@@ -829,7 +858,7 @@
           <a:p>
             <a:fld id="{8A36C09B-041E-469C-AF42-668EC102CB61}" type="datetimeFigureOut">
               <a:rPr lang="en-IN" smtClean="0"/>
-              <a:t>01-03-2022</a:t>
+              <a:t>15-03-2022</a:t>
             </a:fld>
             <a:endParaRPr lang="en-IN"/>
           </a:p>
@@ -1039,7 +1068,7 @@
           <a:p>
             <a:fld id="{8A36C09B-041E-469C-AF42-668EC102CB61}" type="datetimeFigureOut">
               <a:rPr lang="en-IN" smtClean="0"/>
-              <a:t>01-03-2022</a:t>
+              <a:t>15-03-2022</a:t>
             </a:fld>
             <a:endParaRPr lang="en-IN"/>
           </a:p>
@@ -1239,7 +1268,7 @@
           <a:p>
             <a:fld id="{8A36C09B-041E-469C-AF42-668EC102CB61}" type="datetimeFigureOut">
               <a:rPr lang="en-IN" smtClean="0"/>
-              <a:t>01-03-2022</a:t>
+              <a:t>15-03-2022</a:t>
             </a:fld>
             <a:endParaRPr lang="en-IN"/>
           </a:p>
@@ -1515,7 +1544,7 @@
           <a:p>
             <a:fld id="{8A36C09B-041E-469C-AF42-668EC102CB61}" type="datetimeFigureOut">
               <a:rPr lang="en-IN" smtClean="0"/>
-              <a:t>01-03-2022</a:t>
+              <a:t>15-03-2022</a:t>
             </a:fld>
             <a:endParaRPr lang="en-IN"/>
           </a:p>
@@ -1783,7 +1812,7 @@
           <a:p>
             <a:fld id="{8A36C09B-041E-469C-AF42-668EC102CB61}" type="datetimeFigureOut">
               <a:rPr lang="en-IN" smtClean="0"/>
-              <a:t>01-03-2022</a:t>
+              <a:t>15-03-2022</a:t>
             </a:fld>
             <a:endParaRPr lang="en-IN"/>
           </a:p>
@@ -2198,7 +2227,7 @@
           <a:p>
             <a:fld id="{8A36C09B-041E-469C-AF42-668EC102CB61}" type="datetimeFigureOut">
               <a:rPr lang="en-IN" smtClean="0"/>
-              <a:t>01-03-2022</a:t>
+              <a:t>15-03-2022</a:t>
             </a:fld>
             <a:endParaRPr lang="en-IN"/>
           </a:p>
@@ -2340,7 +2369,7 @@
           <a:p>
             <a:fld id="{8A36C09B-041E-469C-AF42-668EC102CB61}" type="datetimeFigureOut">
               <a:rPr lang="en-IN" smtClean="0"/>
-              <a:t>01-03-2022</a:t>
+              <a:t>15-03-2022</a:t>
             </a:fld>
             <a:endParaRPr lang="en-IN"/>
           </a:p>
@@ -2453,7 +2482,7 @@
           <a:p>
             <a:fld id="{8A36C09B-041E-469C-AF42-668EC102CB61}" type="datetimeFigureOut">
               <a:rPr lang="en-IN" smtClean="0"/>
-              <a:t>01-03-2022</a:t>
+              <a:t>15-03-2022</a:t>
             </a:fld>
             <a:endParaRPr lang="en-IN"/>
           </a:p>
@@ -2766,7 +2795,7 @@
           <a:p>
             <a:fld id="{8A36C09B-041E-469C-AF42-668EC102CB61}" type="datetimeFigureOut">
               <a:rPr lang="en-IN" smtClean="0"/>
-              <a:t>01-03-2022</a:t>
+              <a:t>15-03-2022</a:t>
             </a:fld>
             <a:endParaRPr lang="en-IN"/>
           </a:p>
@@ -3055,7 +3084,7 @@
           <a:p>
             <a:fld id="{8A36C09B-041E-469C-AF42-668EC102CB61}" type="datetimeFigureOut">
               <a:rPr lang="en-IN" smtClean="0"/>
-              <a:t>01-03-2022</a:t>
+              <a:t>15-03-2022</a:t>
             </a:fld>
             <a:endParaRPr lang="en-IN"/>
           </a:p>
@@ -3298,7 +3327,7 @@
           <a:p>
             <a:fld id="{8A36C09B-041E-469C-AF42-668EC102CB61}" type="datetimeFigureOut">
               <a:rPr lang="en-IN" smtClean="0"/>
-              <a:t>01-03-2022</a:t>
+              <a:t>15-03-2022</a:t>
             </a:fld>
             <a:endParaRPr lang="en-IN"/>
           </a:p>
@@ -5685,10 +5714,322 @@
           <a:chExt cx="0" cy="0"/>
         </a:xfrm>
       </p:grpSpPr>
+      <p:pic>
+        <p:nvPicPr>
+          <p:cNvPr id="3" name="Picture 2">
+            <a:extLst>
+              <a:ext uri="{FF2B5EF4-FFF2-40B4-BE49-F238E27FC236}">
+                <a16:creationId xmlns:a16="http://schemas.microsoft.com/office/drawing/2014/main" id="{95F4BD86-C6C1-4879-8162-231C8E2E84C5}"/>
+              </a:ext>
+            </a:extLst>
+          </p:cNvPr>
+          <p:cNvPicPr>
+            <a:picLocks noChangeAspect="1"/>
+          </p:cNvPicPr>
+          <p:nvPr/>
+        </p:nvPicPr>
+        <p:blipFill>
+          <a:blip r:embed="rId2"/>
+          <a:stretch>
+            <a:fillRect/>
+          </a:stretch>
+        </p:blipFill>
+        <p:spPr>
+          <a:xfrm>
+            <a:off x="404911" y="113644"/>
+            <a:ext cx="8496737" cy="5645440"/>
+          </a:xfrm>
+          <a:prstGeom prst="rect">
+            <a:avLst/>
+          </a:prstGeom>
+        </p:spPr>
+      </p:pic>
+      <mc:AlternateContent xmlns:mc="http://schemas.openxmlformats.org/markup-compatibility/2006" xmlns:p14="http://schemas.microsoft.com/office/powerpoint/2010/main">
+        <mc:Choice Requires="p14">
+          <p:contentPart p14:bwMode="auto" r:id="rId3">
+            <p14:nvContentPartPr>
+              <p14:cNvPr id="4" name="Ink 3">
+                <a:extLst>
+                  <a:ext uri="{FF2B5EF4-FFF2-40B4-BE49-F238E27FC236}">
+                    <a16:creationId xmlns:a16="http://schemas.microsoft.com/office/drawing/2014/main" id="{39A13BB5-2E06-42D4-8D1C-97A0A2C8850F}"/>
+                  </a:ext>
+                </a:extLst>
+              </p14:cNvPr>
+              <p14:cNvContentPartPr/>
+              <p14:nvPr/>
+            </p14:nvContentPartPr>
+            <p14:xfrm>
+              <a:off x="126120" y="2122160"/>
+              <a:ext cx="2585520" cy="1617480"/>
+            </p14:xfrm>
+          </p:contentPart>
+        </mc:Choice>
+        <mc:Fallback xmlns="">
+          <p:pic>
+            <p:nvPicPr>
+              <p:cNvPr id="4" name="Ink 3">
+                <a:extLst>
+                  <a:ext uri="{FF2B5EF4-FFF2-40B4-BE49-F238E27FC236}">
+                    <a16:creationId xmlns:a16="http://schemas.microsoft.com/office/drawing/2014/main" id="{39A13BB5-2E06-42D4-8D1C-97A0A2C8850F}"/>
+                  </a:ext>
+                </a:extLst>
+              </p:cNvPr>
+              <p:cNvPicPr/>
+              <p:nvPr/>
+            </p:nvPicPr>
+            <p:blipFill>
+              <a:blip r:embed="rId4"/>
+              <a:stretch>
+                <a:fillRect/>
+              </a:stretch>
+            </p:blipFill>
+            <p:spPr>
+              <a:xfrm>
+                <a:off x="117480" y="2113520"/>
+                <a:ext cx="2603160" cy="1635120"/>
+              </a:xfrm>
+              <a:prstGeom prst="rect">
+                <a:avLst/>
+              </a:prstGeom>
+            </p:spPr>
+          </p:pic>
+        </mc:Fallback>
+      </mc:AlternateContent>
+      <p:sp>
+        <p:nvSpPr>
+          <p:cNvPr id="5" name="TextBox 4">
+            <a:extLst>
+              <a:ext uri="{FF2B5EF4-FFF2-40B4-BE49-F238E27FC236}">
+                <a16:creationId xmlns:a16="http://schemas.microsoft.com/office/drawing/2014/main" id="{26E7277D-1AF8-4296-A748-B37E80E5929E}"/>
+              </a:ext>
+            </a:extLst>
+          </p:cNvPr>
+          <p:cNvSpPr txBox="1"/>
+          <p:nvPr/>
+        </p:nvSpPr>
+        <p:spPr>
+          <a:xfrm flipH="1">
+            <a:off x="3062559" y="1383546"/>
+            <a:ext cx="3886201" cy="1754326"/>
+          </a:xfrm>
+          <a:prstGeom prst="rect">
+            <a:avLst/>
+          </a:prstGeom>
+          <a:solidFill>
+            <a:schemeClr val="accent2"/>
+          </a:solidFill>
+        </p:spPr>
+        <p:txBody>
+          <a:bodyPr wrap="square" rtlCol="0">
+            <a:spAutoFit/>
+          </a:bodyPr>
+          <a:lstStyle/>
+          <a:p>
+            <a:r>
+              <a:rPr lang="en-US" dirty="0"/>
+              <a:t>Remove Register New Employee from the sidebar component.</a:t>
+            </a:r>
+          </a:p>
+          <a:p>
+            <a:r>
+              <a:rPr lang="en-US" dirty="0"/>
+              <a:t>Rename View ALL Employees as </a:t>
+            </a:r>
+            <a:r>
+              <a:rPr lang="en-US" b="1" dirty="0"/>
+              <a:t>Employee management.</a:t>
+            </a:r>
+          </a:p>
+          <a:p>
+            <a:r>
+              <a:rPr lang="en-US" dirty="0"/>
+              <a:t>Introduce a button to add a new Employee under this Menu</a:t>
+            </a:r>
+          </a:p>
+        </p:txBody>
+      </p:sp>
+      <p:sp>
+        <p:nvSpPr>
+          <p:cNvPr id="8" name="TextBox 7">
+            <a:extLst>
+              <a:ext uri="{FF2B5EF4-FFF2-40B4-BE49-F238E27FC236}">
+                <a16:creationId xmlns:a16="http://schemas.microsoft.com/office/drawing/2014/main" id="{6BFAEB9C-13A6-42A7-93BD-8DF891A53BC7}"/>
+              </a:ext>
+            </a:extLst>
+          </p:cNvPr>
+          <p:cNvSpPr txBox="1"/>
+          <p:nvPr/>
+        </p:nvSpPr>
+        <p:spPr>
+          <a:xfrm flipH="1">
+            <a:off x="9180439" y="447040"/>
+            <a:ext cx="1432562" cy="369332"/>
+          </a:xfrm>
+          <a:prstGeom prst="rect">
+            <a:avLst/>
+          </a:prstGeom>
+          <a:solidFill>
+            <a:srgbClr val="FFFF00"/>
+          </a:solidFill>
+        </p:spPr>
+        <p:txBody>
+          <a:bodyPr wrap="square" rtlCol="0">
+            <a:spAutoFit/>
+          </a:bodyPr>
+          <a:lstStyle/>
+          <a:p>
+            <a:r>
+              <a:rPr lang="en-US" dirty="0"/>
+              <a:t>16 hours</a:t>
+            </a:r>
+            <a:endParaRPr lang="en-IN" dirty="0"/>
+          </a:p>
+        </p:txBody>
+      </p:sp>
     </p:spTree>
     <p:extLst>
       <p:ext uri="{BB962C8B-B14F-4D97-AF65-F5344CB8AC3E}">
         <p14:creationId xmlns:p14="http://schemas.microsoft.com/office/powerpoint/2010/main" val="1811999387"/>
+      </p:ext>
+    </p:extLst>
+  </p:cSld>
+  <p:clrMapOvr>
+    <a:masterClrMapping/>
+  </p:clrMapOvr>
+</p:sld>
+</file>
+
+<file path=ppt/slides/slide5.xml><?xml version="1.0" encoding="utf-8"?>
+<p:sld xmlns:a="http://schemas.openxmlformats.org/drawingml/2006/main" xmlns:r="http://schemas.openxmlformats.org/officeDocument/2006/relationships" xmlns:p="http://schemas.openxmlformats.org/presentationml/2006/main">
+  <p:cSld>
+    <p:spTree>
+      <p:nvGrpSpPr>
+        <p:cNvPr id="1" name=""/>
+        <p:cNvGrpSpPr/>
+        <p:nvPr/>
+      </p:nvGrpSpPr>
+      <p:grpSpPr>
+        <a:xfrm>
+          <a:off x="0" y="0"/>
+          <a:ext cx="0" cy="0"/>
+          <a:chOff x="0" y="0"/>
+          <a:chExt cx="0" cy="0"/>
+        </a:xfrm>
+      </p:grpSpPr>
+      <p:pic>
+        <p:nvPicPr>
+          <p:cNvPr id="6" name="Picture 5">
+            <a:extLst>
+              <a:ext uri="{FF2B5EF4-FFF2-40B4-BE49-F238E27FC236}">
+                <a16:creationId xmlns:a16="http://schemas.microsoft.com/office/drawing/2014/main" id="{151B6CD9-AEE7-4214-A926-8C9F1EF5B2FF}"/>
+              </a:ext>
+            </a:extLst>
+          </p:cNvPr>
+          <p:cNvPicPr>
+            <a:picLocks noChangeAspect="1"/>
+          </p:cNvPicPr>
+          <p:nvPr/>
+        </p:nvPicPr>
+        <p:blipFill>
+          <a:blip r:embed="rId2"/>
+          <a:stretch>
+            <a:fillRect/>
+          </a:stretch>
+        </p:blipFill>
+        <p:spPr>
+          <a:xfrm>
+            <a:off x="580773" y="241804"/>
+            <a:ext cx="9811254" cy="5073911"/>
+          </a:xfrm>
+          <a:prstGeom prst="rect">
+            <a:avLst/>
+          </a:prstGeom>
+        </p:spPr>
+      </p:pic>
+      <p:sp>
+        <p:nvSpPr>
+          <p:cNvPr id="7" name="TextBox 6">
+            <a:extLst>
+              <a:ext uri="{FF2B5EF4-FFF2-40B4-BE49-F238E27FC236}">
+                <a16:creationId xmlns:a16="http://schemas.microsoft.com/office/drawing/2014/main" id="{237E5928-FEB2-4BA6-98D8-A85BCD38CF53}"/>
+              </a:ext>
+            </a:extLst>
+          </p:cNvPr>
+          <p:cNvSpPr txBox="1"/>
+          <p:nvPr/>
+        </p:nvSpPr>
+        <p:spPr>
+          <a:xfrm>
+            <a:off x="7721600" y="4612640"/>
+            <a:ext cx="1818640" cy="369332"/>
+          </a:xfrm>
+          <a:prstGeom prst="rect">
+            <a:avLst/>
+          </a:prstGeom>
+          <a:noFill/>
+        </p:spPr>
+        <p:txBody>
+          <a:bodyPr wrap="square" rtlCol="0">
+            <a:spAutoFit/>
+          </a:bodyPr>
+          <a:lstStyle/>
+          <a:p>
+            <a:r>
+              <a:rPr lang="en-US" dirty="0"/>
+              <a:t>ADD EMPLOYEE</a:t>
+            </a:r>
+            <a:endParaRPr lang="en-IN" dirty="0"/>
+          </a:p>
+        </p:txBody>
+      </p:sp>
+      <p:sp>
+        <p:nvSpPr>
+          <p:cNvPr id="11" name="TextBox 10">
+            <a:extLst>
+              <a:ext uri="{FF2B5EF4-FFF2-40B4-BE49-F238E27FC236}">
+                <a16:creationId xmlns:a16="http://schemas.microsoft.com/office/drawing/2014/main" id="{BEB9FA88-8CAD-48C4-96C8-03106B17CF10}"/>
+              </a:ext>
+            </a:extLst>
+          </p:cNvPr>
+          <p:cNvSpPr txBox="1"/>
+          <p:nvPr/>
+        </p:nvSpPr>
+        <p:spPr>
+          <a:xfrm>
+            <a:off x="3111934" y="4612640"/>
+            <a:ext cx="1818640" cy="1200329"/>
+          </a:xfrm>
+          <a:prstGeom prst="rect">
+            <a:avLst/>
+          </a:prstGeom>
+          <a:noFill/>
+        </p:spPr>
+        <p:txBody>
+          <a:bodyPr wrap="square" rtlCol="0">
+            <a:spAutoFit/>
+          </a:bodyPr>
+          <a:lstStyle/>
+          <a:p>
+            <a:r>
+              <a:rPr lang="en-US" dirty="0"/>
+              <a:t>On Click </a:t>
+            </a:r>
+            <a:r>
+              <a:rPr lang="en-US" b="1" dirty="0"/>
+              <a:t>ADD EMPLOYEE </a:t>
+            </a:r>
+            <a:r>
+              <a:rPr lang="en-US" dirty="0"/>
+              <a:t> Button, form should popup</a:t>
+            </a:r>
+            <a:endParaRPr lang="en-IN" b="1" dirty="0"/>
+          </a:p>
+        </p:txBody>
+      </p:sp>
+    </p:spTree>
+    <p:extLst>
+      <p:ext uri="{BB962C8B-B14F-4D97-AF65-F5344CB8AC3E}">
+        <p14:creationId xmlns:p14="http://schemas.microsoft.com/office/powerpoint/2010/main" val="2174249906"/>
       </p:ext>
     </p:extLst>
   </p:cSld>

</xml_diff>

<commit_message>
Before Implementing Reactive Form
</commit_message>
<xml_diff>
--- a/Presentation1.pptx
+++ b/Presentation1.pptx
@@ -10,6 +10,7 @@
     <p:sldId id="258" r:id="rId4"/>
     <p:sldId id="259" r:id="rId5"/>
     <p:sldId id="260" r:id="rId6"/>
+    <p:sldId id="261" r:id="rId7"/>
   </p:sldIdLst>
   <p:sldSz cx="12192000" cy="6858000"/>
   <p:notesSz cx="6858000" cy="9144000"/>
@@ -658,7 +659,7 @@
           <a:p>
             <a:fld id="{8A36C09B-041E-469C-AF42-668EC102CB61}" type="datetimeFigureOut">
               <a:rPr lang="en-IN" smtClean="0"/>
-              <a:t>15-03-2022</a:t>
+              <a:t>22-03-2022</a:t>
             </a:fld>
             <a:endParaRPr lang="en-IN"/>
           </a:p>
@@ -858,7 +859,7 @@
           <a:p>
             <a:fld id="{8A36C09B-041E-469C-AF42-668EC102CB61}" type="datetimeFigureOut">
               <a:rPr lang="en-IN" smtClean="0"/>
-              <a:t>15-03-2022</a:t>
+              <a:t>22-03-2022</a:t>
             </a:fld>
             <a:endParaRPr lang="en-IN"/>
           </a:p>
@@ -1068,7 +1069,7 @@
           <a:p>
             <a:fld id="{8A36C09B-041E-469C-AF42-668EC102CB61}" type="datetimeFigureOut">
               <a:rPr lang="en-IN" smtClean="0"/>
-              <a:t>15-03-2022</a:t>
+              <a:t>22-03-2022</a:t>
             </a:fld>
             <a:endParaRPr lang="en-IN"/>
           </a:p>
@@ -1268,7 +1269,7 @@
           <a:p>
             <a:fld id="{8A36C09B-041E-469C-AF42-668EC102CB61}" type="datetimeFigureOut">
               <a:rPr lang="en-IN" smtClean="0"/>
-              <a:t>15-03-2022</a:t>
+              <a:t>22-03-2022</a:t>
             </a:fld>
             <a:endParaRPr lang="en-IN"/>
           </a:p>
@@ -1544,7 +1545,7 @@
           <a:p>
             <a:fld id="{8A36C09B-041E-469C-AF42-668EC102CB61}" type="datetimeFigureOut">
               <a:rPr lang="en-IN" smtClean="0"/>
-              <a:t>15-03-2022</a:t>
+              <a:t>22-03-2022</a:t>
             </a:fld>
             <a:endParaRPr lang="en-IN"/>
           </a:p>
@@ -1812,7 +1813,7 @@
           <a:p>
             <a:fld id="{8A36C09B-041E-469C-AF42-668EC102CB61}" type="datetimeFigureOut">
               <a:rPr lang="en-IN" smtClean="0"/>
-              <a:t>15-03-2022</a:t>
+              <a:t>22-03-2022</a:t>
             </a:fld>
             <a:endParaRPr lang="en-IN"/>
           </a:p>
@@ -2227,7 +2228,7 @@
           <a:p>
             <a:fld id="{8A36C09B-041E-469C-AF42-668EC102CB61}" type="datetimeFigureOut">
               <a:rPr lang="en-IN" smtClean="0"/>
-              <a:t>15-03-2022</a:t>
+              <a:t>22-03-2022</a:t>
             </a:fld>
             <a:endParaRPr lang="en-IN"/>
           </a:p>
@@ -2369,7 +2370,7 @@
           <a:p>
             <a:fld id="{8A36C09B-041E-469C-AF42-668EC102CB61}" type="datetimeFigureOut">
               <a:rPr lang="en-IN" smtClean="0"/>
-              <a:t>15-03-2022</a:t>
+              <a:t>22-03-2022</a:t>
             </a:fld>
             <a:endParaRPr lang="en-IN"/>
           </a:p>
@@ -2482,7 +2483,7 @@
           <a:p>
             <a:fld id="{8A36C09B-041E-469C-AF42-668EC102CB61}" type="datetimeFigureOut">
               <a:rPr lang="en-IN" smtClean="0"/>
-              <a:t>15-03-2022</a:t>
+              <a:t>22-03-2022</a:t>
             </a:fld>
             <a:endParaRPr lang="en-IN"/>
           </a:p>
@@ -2795,7 +2796,7 @@
           <a:p>
             <a:fld id="{8A36C09B-041E-469C-AF42-668EC102CB61}" type="datetimeFigureOut">
               <a:rPr lang="en-IN" smtClean="0"/>
-              <a:t>15-03-2022</a:t>
+              <a:t>22-03-2022</a:t>
             </a:fld>
             <a:endParaRPr lang="en-IN"/>
           </a:p>
@@ -3084,7 +3085,7 @@
           <a:p>
             <a:fld id="{8A36C09B-041E-469C-AF42-668EC102CB61}" type="datetimeFigureOut">
               <a:rPr lang="en-IN" smtClean="0"/>
-              <a:t>15-03-2022</a:t>
+              <a:t>22-03-2022</a:t>
             </a:fld>
             <a:endParaRPr lang="en-IN"/>
           </a:p>
@@ -3327,7 +3328,7 @@
           <a:p>
             <a:fld id="{8A36C09B-041E-469C-AF42-668EC102CB61}" type="datetimeFigureOut">
               <a:rPr lang="en-IN" smtClean="0"/>
-              <a:t>15-03-2022</a:t>
+              <a:t>22-03-2022</a:t>
             </a:fld>
             <a:endParaRPr lang="en-IN"/>
           </a:p>
@@ -6039,6 +6040,263 @@
 </p:sld>
 </file>
 
+<file path=ppt/slides/slide6.xml><?xml version="1.0" encoding="utf-8"?>
+<p:sld xmlns:a="http://schemas.openxmlformats.org/drawingml/2006/main" xmlns:r="http://schemas.openxmlformats.org/officeDocument/2006/relationships" xmlns:p="http://schemas.openxmlformats.org/presentationml/2006/main">
+  <p:cSld>
+    <p:spTree>
+      <p:nvGrpSpPr>
+        <p:cNvPr id="1" name=""/>
+        <p:cNvGrpSpPr/>
+        <p:nvPr/>
+      </p:nvGrpSpPr>
+      <p:grpSpPr>
+        <a:xfrm>
+          <a:off x="0" y="0"/>
+          <a:ext cx="0" cy="0"/>
+          <a:chOff x="0" y="0"/>
+          <a:chExt cx="0" cy="0"/>
+        </a:xfrm>
+      </p:grpSpPr>
+      <p:grpSp>
+        <p:nvGrpSpPr>
+          <p:cNvPr id="5" name="Group 4">
+            <a:extLst>
+              <a:ext uri="{FF2B5EF4-FFF2-40B4-BE49-F238E27FC236}">
+                <a16:creationId xmlns:a16="http://schemas.microsoft.com/office/drawing/2014/main" id="{A495EC17-28A7-4ED7-BE73-2992CC2D77CA}"/>
+              </a:ext>
+            </a:extLst>
+          </p:cNvPr>
+          <p:cNvGrpSpPr/>
+          <p:nvPr/>
+        </p:nvGrpSpPr>
+        <p:grpSpPr>
+          <a:xfrm>
+            <a:off x="211437" y="196818"/>
+            <a:ext cx="10995539" cy="6248587"/>
+            <a:chOff x="256042" y="486750"/>
+            <a:chExt cx="10571083" cy="5884499"/>
+          </a:xfrm>
+        </p:grpSpPr>
+        <p:pic>
+          <p:nvPicPr>
+            <p:cNvPr id="3" name="Picture 2">
+              <a:extLst>
+                <a:ext uri="{FF2B5EF4-FFF2-40B4-BE49-F238E27FC236}">
+                  <a16:creationId xmlns:a16="http://schemas.microsoft.com/office/drawing/2014/main" id="{A7F38320-F1C0-494A-9B6A-3B26240E1BA0}"/>
+                </a:ext>
+              </a:extLst>
+            </p:cNvPr>
+            <p:cNvPicPr>
+              <a:picLocks noChangeAspect="1"/>
+            </p:cNvPicPr>
+            <p:nvPr/>
+          </p:nvPicPr>
+          <p:blipFill>
+            <a:blip r:embed="rId2"/>
+            <a:stretch>
+              <a:fillRect/>
+            </a:stretch>
+          </p:blipFill>
+          <p:spPr>
+            <a:xfrm>
+              <a:off x="256042" y="486750"/>
+              <a:ext cx="10571083" cy="5884499"/>
+            </a:xfrm>
+            <a:prstGeom prst="rect">
+              <a:avLst/>
+            </a:prstGeom>
+          </p:spPr>
+        </p:pic>
+        <p:sp>
+          <p:nvSpPr>
+            <p:cNvPr id="4" name="TextBox 3">
+              <a:extLst>
+                <a:ext uri="{FF2B5EF4-FFF2-40B4-BE49-F238E27FC236}">
+                  <a16:creationId xmlns:a16="http://schemas.microsoft.com/office/drawing/2014/main" id="{A363CBA7-1CDE-4FC1-9956-8AE34956DC5F}"/>
+                </a:ext>
+              </a:extLst>
+            </p:cNvPr>
+            <p:cNvSpPr txBox="1"/>
+            <p:nvPr/>
+          </p:nvSpPr>
+          <p:spPr>
+            <a:xfrm>
+              <a:off x="2626403" y="1331126"/>
+              <a:ext cx="1878404" cy="369332"/>
+            </a:xfrm>
+            <a:prstGeom prst="rect">
+              <a:avLst/>
+            </a:prstGeom>
+            <a:solidFill>
+              <a:schemeClr val="accent2"/>
+            </a:solidFill>
+            <a:ln>
+              <a:solidFill>
+                <a:schemeClr val="tx1"/>
+              </a:solidFill>
+            </a:ln>
+          </p:spPr>
+          <p:txBody>
+            <a:bodyPr wrap="square" rtlCol="0">
+              <a:spAutoFit/>
+            </a:bodyPr>
+            <a:lstStyle/>
+            <a:p>
+              <a:r>
+                <a:rPr lang="en-US" dirty="0"/>
+                <a:t>Search by Emp ID</a:t>
+              </a:r>
+              <a:endParaRPr lang="en-IN" dirty="0"/>
+            </a:p>
+          </p:txBody>
+        </p:sp>
+        <p:sp>
+          <p:nvSpPr>
+            <p:cNvPr id="8" name="TextBox 7">
+              <a:extLst>
+                <a:ext uri="{FF2B5EF4-FFF2-40B4-BE49-F238E27FC236}">
+                  <a16:creationId xmlns:a16="http://schemas.microsoft.com/office/drawing/2014/main" id="{278D6770-6BFE-4AAD-9ABE-F2E06EC981F1}"/>
+                </a:ext>
+              </a:extLst>
+            </p:cNvPr>
+            <p:cNvSpPr txBox="1"/>
+            <p:nvPr/>
+          </p:nvSpPr>
+          <p:spPr>
+            <a:xfrm>
+              <a:off x="6399365" y="1331126"/>
+              <a:ext cx="1734589" cy="369332"/>
+            </a:xfrm>
+            <a:prstGeom prst="rect">
+              <a:avLst/>
+            </a:prstGeom>
+            <a:solidFill>
+              <a:schemeClr val="accent2"/>
+            </a:solidFill>
+            <a:ln>
+              <a:solidFill>
+                <a:schemeClr val="tx1"/>
+              </a:solidFill>
+            </a:ln>
+          </p:spPr>
+          <p:txBody>
+            <a:bodyPr wrap="square" rtlCol="0">
+              <a:spAutoFit/>
+            </a:bodyPr>
+            <a:lstStyle/>
+            <a:p>
+              <a:r>
+                <a:rPr lang="en-US" dirty="0"/>
+                <a:t>Search by </a:t>
+              </a:r>
+              <a:r>
+                <a:rPr lang="en-US" dirty="0" err="1"/>
+                <a:t>EMail</a:t>
+              </a:r>
+              <a:endParaRPr lang="en-IN" dirty="0"/>
+            </a:p>
+          </p:txBody>
+        </p:sp>
+        <p:sp>
+          <p:nvSpPr>
+            <p:cNvPr id="9" name="TextBox 8">
+              <a:extLst>
+                <a:ext uri="{FF2B5EF4-FFF2-40B4-BE49-F238E27FC236}">
+                  <a16:creationId xmlns:a16="http://schemas.microsoft.com/office/drawing/2014/main" id="{A8D1F398-9C21-4E55-A2AC-C81B33313B33}"/>
+                </a:ext>
+              </a:extLst>
+            </p:cNvPr>
+            <p:cNvSpPr txBox="1"/>
+            <p:nvPr/>
+          </p:nvSpPr>
+          <p:spPr>
+            <a:xfrm>
+              <a:off x="8200001" y="782601"/>
+              <a:ext cx="2376793" cy="923330"/>
+            </a:xfrm>
+            <a:prstGeom prst="rect">
+              <a:avLst/>
+            </a:prstGeom>
+            <a:solidFill>
+              <a:schemeClr val="accent2"/>
+            </a:solidFill>
+            <a:ln>
+              <a:solidFill>
+                <a:schemeClr val="tx1"/>
+              </a:solidFill>
+            </a:ln>
+          </p:spPr>
+          <p:txBody>
+            <a:bodyPr wrap="square" rtlCol="0">
+              <a:spAutoFit/>
+            </a:bodyPr>
+            <a:lstStyle/>
+            <a:p>
+              <a:r>
+                <a:rPr lang="en-US" dirty="0"/>
+                <a:t>Search Dropdown for Department &amp; Reporting</a:t>
+              </a:r>
+              <a:endParaRPr lang="en-IN" dirty="0"/>
+            </a:p>
+          </p:txBody>
+        </p:sp>
+        <p:sp>
+          <p:nvSpPr>
+            <p:cNvPr id="10" name="TextBox 9">
+              <a:extLst>
+                <a:ext uri="{FF2B5EF4-FFF2-40B4-BE49-F238E27FC236}">
+                  <a16:creationId xmlns:a16="http://schemas.microsoft.com/office/drawing/2014/main" id="{BCC217F9-AA88-4642-89A4-78DF5BD0C68A}"/>
+                </a:ext>
+              </a:extLst>
+            </p:cNvPr>
+            <p:cNvSpPr txBox="1"/>
+            <p:nvPr/>
+          </p:nvSpPr>
+          <p:spPr>
+            <a:xfrm>
+              <a:off x="4598729" y="1331126"/>
+              <a:ext cx="1734589" cy="369332"/>
+            </a:xfrm>
+            <a:prstGeom prst="rect">
+              <a:avLst/>
+            </a:prstGeom>
+            <a:solidFill>
+              <a:schemeClr val="accent2"/>
+            </a:solidFill>
+            <a:ln>
+              <a:solidFill>
+                <a:schemeClr val="tx1"/>
+              </a:solidFill>
+            </a:ln>
+          </p:spPr>
+          <p:txBody>
+            <a:bodyPr wrap="square" rtlCol="0">
+              <a:spAutoFit/>
+            </a:bodyPr>
+            <a:lstStyle/>
+            <a:p>
+              <a:r>
+                <a:rPr lang="en-US" dirty="0"/>
+                <a:t>Search by Name</a:t>
+              </a:r>
+              <a:endParaRPr lang="en-IN" dirty="0"/>
+            </a:p>
+          </p:txBody>
+        </p:sp>
+      </p:grpSp>
+    </p:spTree>
+    <p:extLst>
+      <p:ext uri="{BB962C8B-B14F-4D97-AF65-F5344CB8AC3E}">
+        <p14:creationId xmlns:p14="http://schemas.microsoft.com/office/powerpoint/2010/main" val="2516155908"/>
+      </p:ext>
+    </p:extLst>
+  </p:cSld>
+  <p:clrMapOvr>
+    <a:masterClrMapping/>
+  </p:clrMapOvr>
+</p:sld>
+</file>
+
 <file path=ppt/theme/theme1.xml><?xml version="1.0" encoding="utf-8"?>
 <a:theme xmlns:a="http://schemas.openxmlformats.org/drawingml/2006/main" name="Office Theme">
   <a:themeElements>

</xml_diff>